<commit_message>
Fix incorrect speed tags in NotesToAudio test PPT.
</commit_message>
<xml_diff>
--- a/doc/NoteToAudio test scenarios.pptx
+++ b/doc/NoteToAudio test scenarios.pptx
@@ -108,6 +108,22 @@
       </a:defRPr>
     </a:lvl9pPr>
   </p:defaultTextStyle>
+  <p:extLst>
+    <p:ext uri="{EFAFB233-063F-42B5-8137-9DF3F51BA10A}">
+      <p15:sldGuideLst xmlns:p15="http://schemas.microsoft.com/office/powerpoint/2012/main">
+        <p15:guide id="1" orient="horz" pos="2160">
+          <p15:clr>
+            <a:srgbClr val="A4A3A4"/>
+          </p15:clr>
+        </p15:guide>
+        <p15:guide id="2" pos="2880">
+          <p15:clr>
+            <a:srgbClr val="A4A3A4"/>
+          </p15:clr>
+        </p15:guide>
+      </p15:sldGuideLst>
+    </p:ext>
+  </p:extLst>
 </p:presentation>
 </file>
 
@@ -193,7 +209,7 @@
           <a:p>
             <a:fld id="{57ED280A-559F-4E1B-9B24-3157C9692275}" type="datetimeFigureOut">
               <a:rPr lang="en-SG" smtClean="0"/>
-              <a:t>29/12/2013</a:t>
+              <a:t>30/12/2013</a:t>
             </a:fld>
             <a:endParaRPr lang="en-SG"/>
           </a:p>
@@ -517,7 +533,6 @@
               <a:rPr lang="en-US" dirty="0" smtClean="0"/>
               <a:t> </a:t>
             </a:r>
-            <a:endParaRPr lang="en-US" dirty="0" smtClean="0"/>
           </a:p>
           <a:p>
             <a:pPr marL="0" marR="0" indent="0" algn="l" defTabSz="914400" rtl="0" eaLnBrk="1" fontAlgn="auto" latinLnBrk="0" hangingPunct="1">
@@ -562,11 +577,7 @@
             </a:r>
             <a:r>
               <a:rPr lang="en-US" baseline="0" dirty="0" smtClean="0"/>
-              <a:t> this is a slow segment </a:t>
-            </a:r>
-            <a:r>
-              <a:rPr lang="en-US" baseline="0" dirty="0" smtClean="0"/>
-              <a:t>[</a:t>
+              <a:t> this is a slow segment [</a:t>
             </a:r>
             <a:r>
               <a:rPr lang="en-US" baseline="0" dirty="0" err="1" smtClean="0"/>
@@ -611,11 +622,19 @@
             </a:pPr>
             <a:r>
               <a:rPr lang="en-US" dirty="0" smtClean="0"/>
-              <a:t>[speed: slow]</a:t>
+              <a:t>[speed: </a:t>
+            </a:r>
+            <a:r>
+              <a:rPr lang="en-US" dirty="0" smtClean="0"/>
+              <a:t>medium]</a:t>
             </a:r>
             <a:r>
               <a:rPr lang="en-US" baseline="0" dirty="0" smtClean="0"/>
-              <a:t> this is a medium segment [</a:t>
+              <a:t> </a:t>
+            </a:r>
+            <a:r>
+              <a:rPr lang="en-US" baseline="0" dirty="0" smtClean="0"/>
+              <a:t>this is a medium segment [</a:t>
             </a:r>
             <a:r>
               <a:rPr lang="en-US" baseline="0" dirty="0" err="1" smtClean="0"/>
@@ -681,7 +700,19 @@
             </a:pPr>
             <a:r>
               <a:rPr lang="en-US" dirty="0" smtClean="0"/>
-              <a:t>[speed: fast]</a:t>
+              <a:t>[speed</a:t>
+            </a:r>
+            <a:r>
+              <a:rPr lang="en-US" smtClean="0"/>
+              <a:t>: </a:t>
+            </a:r>
+            <a:r>
+              <a:rPr lang="en-US" smtClean="0"/>
+              <a:t>extra fast</a:t>
+            </a:r>
+            <a:r>
+              <a:rPr lang="en-US" dirty="0" smtClean="0"/>
+              <a:t>]</a:t>
             </a:r>
             <a:r>
               <a:rPr lang="en-US" baseline="0" dirty="0" smtClean="0"/>
@@ -1092,7 +1123,7 @@
             <a:fld id="{1D8BD707-D9CF-40AE-B4C6-C98DA3205C09}" type="datetimeFigureOut">
               <a:rPr lang="en-US" smtClean="0"/>
               <a:pPr/>
-              <a:t>12/29/2013</a:t>
+              <a:t>12/30/2013</a:t>
             </a:fld>
             <a:endParaRPr lang="en-US"/>
           </a:p>
@@ -1259,7 +1290,7 @@
             <a:fld id="{1D8BD707-D9CF-40AE-B4C6-C98DA3205C09}" type="datetimeFigureOut">
               <a:rPr lang="en-US" smtClean="0"/>
               <a:pPr/>
-              <a:t>12/29/2013</a:t>
+              <a:t>12/30/2013</a:t>
             </a:fld>
             <a:endParaRPr lang="en-US"/>
           </a:p>
@@ -1436,7 +1467,7 @@
             <a:fld id="{1D8BD707-D9CF-40AE-B4C6-C98DA3205C09}" type="datetimeFigureOut">
               <a:rPr lang="en-US" smtClean="0"/>
               <a:pPr/>
-              <a:t>12/29/2013</a:t>
+              <a:t>12/30/2013</a:t>
             </a:fld>
             <a:endParaRPr lang="en-US"/>
           </a:p>
@@ -1603,7 +1634,7 @@
             <a:fld id="{1D8BD707-D9CF-40AE-B4C6-C98DA3205C09}" type="datetimeFigureOut">
               <a:rPr lang="en-US" smtClean="0"/>
               <a:pPr/>
-              <a:t>12/29/2013</a:t>
+              <a:t>12/30/2013</a:t>
             </a:fld>
             <a:endParaRPr lang="en-US"/>
           </a:p>
@@ -1846,7 +1877,7 @@
             <a:fld id="{1D8BD707-D9CF-40AE-B4C6-C98DA3205C09}" type="datetimeFigureOut">
               <a:rPr lang="en-US" smtClean="0"/>
               <a:pPr/>
-              <a:t>12/29/2013</a:t>
+              <a:t>12/30/2013</a:t>
             </a:fld>
             <a:endParaRPr lang="en-US"/>
           </a:p>
@@ -2131,7 +2162,7 @@
             <a:fld id="{1D8BD707-D9CF-40AE-B4C6-C98DA3205C09}" type="datetimeFigureOut">
               <a:rPr lang="en-US" smtClean="0"/>
               <a:pPr/>
-              <a:t>12/29/2013</a:t>
+              <a:t>12/30/2013</a:t>
             </a:fld>
             <a:endParaRPr lang="en-US"/>
           </a:p>
@@ -2550,7 +2581,7 @@
             <a:fld id="{1D8BD707-D9CF-40AE-B4C6-C98DA3205C09}" type="datetimeFigureOut">
               <a:rPr lang="en-US" smtClean="0"/>
               <a:pPr/>
-              <a:t>12/29/2013</a:t>
+              <a:t>12/30/2013</a:t>
             </a:fld>
             <a:endParaRPr lang="en-US"/>
           </a:p>
@@ -2665,7 +2696,7 @@
             <a:fld id="{1D8BD707-D9CF-40AE-B4C6-C98DA3205C09}" type="datetimeFigureOut">
               <a:rPr lang="en-US" smtClean="0"/>
               <a:pPr/>
-              <a:t>12/29/2013</a:t>
+              <a:t>12/30/2013</a:t>
             </a:fld>
             <a:endParaRPr lang="en-US"/>
           </a:p>
@@ -2757,7 +2788,7 @@
             <a:fld id="{1D8BD707-D9CF-40AE-B4C6-C98DA3205C09}" type="datetimeFigureOut">
               <a:rPr lang="en-US" smtClean="0"/>
               <a:pPr/>
-              <a:t>12/29/2013</a:t>
+              <a:t>12/30/2013</a:t>
             </a:fld>
             <a:endParaRPr lang="en-US"/>
           </a:p>
@@ -3031,7 +3062,7 @@
             <a:fld id="{1D8BD707-D9CF-40AE-B4C6-C98DA3205C09}" type="datetimeFigureOut">
               <a:rPr lang="en-US" smtClean="0"/>
               <a:pPr/>
-              <a:t>12/29/2013</a:t>
+              <a:t>12/30/2013</a:t>
             </a:fld>
             <a:endParaRPr lang="en-US"/>
           </a:p>
@@ -3281,7 +3312,7 @@
             <a:fld id="{1D8BD707-D9CF-40AE-B4C6-C98DA3205C09}" type="datetimeFigureOut">
               <a:rPr lang="en-US" smtClean="0"/>
               <a:pPr/>
-              <a:t>12/29/2013</a:t>
+              <a:t>12/30/2013</a:t>
             </a:fld>
             <a:endParaRPr lang="en-US"/>
           </a:p>
@@ -3491,7 +3522,7 @@
             <a:fld id="{1D8BD707-D9CF-40AE-B4C6-C98DA3205C09}" type="datetimeFigureOut">
               <a:rPr lang="en-US" smtClean="0"/>
               <a:pPr/>
-              <a:t>12/29/2013</a:t>
+              <a:t>12/30/2013</a:t>
             </a:fld>
             <a:endParaRPr lang="en-US"/>
           </a:p>

</xml_diff>

<commit_message>
Added modified test scenario to cover issue 109 Update Issue 109 Modified test scenario.
</commit_message>
<xml_diff>
--- a/doc/NoteToAudio test scenarios.pptx
+++ b/doc/NoteToAudio test scenarios.pptx
@@ -110,7 +110,7 @@
   </p:defaultTextStyle>
   <p:extLst>
     <p:ext uri="{EFAFB233-063F-42B5-8137-9DF3F51BA10A}">
-      <p15:sldGuideLst xmlns:p15="http://schemas.microsoft.com/office/powerpoint/2012/main">
+      <p15:sldGuideLst xmlns:p15="http://schemas.microsoft.com/office/powerpoint/2012/main" xmlns="">
         <p15:guide id="1" orient="horz" pos="2160">
           <p15:clr>
             <a:srgbClr val="A4A3A4"/>
@@ -622,19 +622,11 @@
             </a:pPr>
             <a:r>
               <a:rPr lang="en-US" dirty="0" smtClean="0"/>
-              <a:t>[speed: </a:t>
-            </a:r>
-            <a:r>
-              <a:rPr lang="en-US" dirty="0" smtClean="0"/>
-              <a:t>medium]</a:t>
+              <a:t>[speed: medium]</a:t>
             </a:r>
             <a:r>
               <a:rPr lang="en-US" baseline="0" dirty="0" smtClean="0"/>
-              <a:t> </a:t>
-            </a:r>
-            <a:r>
-              <a:rPr lang="en-US" baseline="0" dirty="0" smtClean="0"/>
-              <a:t>this is a medium segment [</a:t>
+              <a:t> this is a medium segment [</a:t>
             </a:r>
             <a:r>
               <a:rPr lang="en-US" baseline="0" dirty="0" err="1" smtClean="0"/>
@@ -700,19 +692,7 @@
             </a:pPr>
             <a:r>
               <a:rPr lang="en-US" dirty="0" smtClean="0"/>
-              <a:t>[speed</a:t>
-            </a:r>
-            <a:r>
-              <a:rPr lang="en-US" smtClean="0"/>
-              <a:t>: </a:t>
-            </a:r>
-            <a:r>
-              <a:rPr lang="en-US" smtClean="0"/>
-              <a:t>extra fast</a:t>
-            </a:r>
-            <a:r>
-              <a:rPr lang="en-US" dirty="0" smtClean="0"/>
-              <a:t>]</a:t>
+              <a:t>[speed: extra fast]</a:t>
             </a:r>
             <a:r>
               <a:rPr lang="en-US" baseline="0" dirty="0" smtClean="0"/>
@@ -835,6 +815,16 @@
         <p:txBody>
           <a:bodyPr/>
           <a:lstStyle/>
+          <a:p>
+            <a:r>
+              <a:rPr lang="en-US" dirty="0" smtClean="0"/>
+              <a:t>This is before any click, but after </a:t>
+            </a:r>
+            <a:r>
+              <a:rPr lang="en-US" smtClean="0"/>
+              <a:t>initial animations.</a:t>
+            </a:r>
+          </a:p>
           <a:p>
             <a:r>
               <a:rPr lang="en-US" dirty="0" smtClean="0"/>
@@ -4258,7 +4248,7 @@
                             </p:stCondLst>
                             <p:childTnLst>
                               <p:par>
-                                <p:cTn id="5" presetID="2" presetClass="entr" presetSubtype="1" fill="hold" grpId="0" nodeType="afterEffect">
+                                <p:cTn id="5" presetID="2" presetClass="entr" presetSubtype="1" fill="hold" grpId="0" nodeType="withEffect">
                                   <p:stCondLst>
                                     <p:cond delay="0"/>
                                   </p:stCondLst>

</xml_diff>